<commit_message>
Update device model summary
</commit_message>
<xml_diff>
--- a/device_model/avr_iot_wm-1.pptx
+++ b/device_model/avr_iot_wm-1.pptx
@@ -218,7 +218,7 @@
           <a:p>
             <a:fld id="{FD501506-38D8-4E22-82D3-5FD4ADAE0670}" type="datetimeFigureOut">
               <a:rPr lang="en-US" smtClean="0"/>
-              <a:t>4/12/23</a:t>
+              <a:t>4/13/23</a:t>
             </a:fld>
             <a:endParaRPr lang="en-US"/>
           </a:p>
@@ -670,7 +670,7 @@
           <a:p>
             <a:fld id="{3620004A-883C-4245-985B-D234050ABC20}" type="datetimeFigureOut">
               <a:rPr lang="en-US" smtClean="0"/>
-              <a:t>4/12/23</a:t>
+              <a:t>4/13/23</a:t>
             </a:fld>
             <a:endParaRPr lang="en-US"/>
           </a:p>
@@ -2632,7 +2632,7 @@
           <a:p>
             <a:fld id="{3620004A-883C-4245-985B-D234050ABC20}" type="datetimeFigureOut">
               <a:rPr lang="en-US" smtClean="0"/>
-              <a:t>4/12/23</a:t>
+              <a:t>4/13/23</a:t>
             </a:fld>
             <a:endParaRPr lang="en-US"/>
           </a:p>
@@ -3188,14 +3188,14 @@
           <p:nvPr>
             <p:extLst>
               <p:ext uri="{D42A27DB-BD31-4B8C-83A1-F6EECF244321}">
-                <p14:modId xmlns:p14="http://schemas.microsoft.com/office/powerpoint/2010/main" val="1275045814"/>
+                <p14:modId xmlns:p14="http://schemas.microsoft.com/office/powerpoint/2010/main" val="701778600"/>
               </p:ext>
             </p:extLst>
           </p:nvPr>
         </p:nvGraphicFramePr>
         <p:xfrm>
-          <a:off x="150939" y="1306137"/>
-          <a:ext cx="8691514" cy="5379720"/>
+          <a:off x="178884" y="1363513"/>
+          <a:ext cx="8786232" cy="3837369"/>
         </p:xfrm>
         <a:graphic>
           <a:graphicData uri="http://schemas.openxmlformats.org/drawingml/2006/table">
@@ -3204,28 +3204,28 @@
                 <a:tableStyleId>{5C22544A-7EE6-4342-B048-85BDC9FD1C3A}</a:tableStyleId>
               </a:tblPr>
               <a:tblGrid>
-                <a:gridCol w="1807446">
+                <a:gridCol w="1634318">
                   <a:extLst>
                     <a:ext uri="{9D8B030D-6E8A-4147-A177-3AD203B41FA5}">
                       <a16:colId xmlns:a16="http://schemas.microsoft.com/office/drawing/2014/main" val="3040698246"/>
                     </a:ext>
                   </a:extLst>
                 </a:gridCol>
-                <a:gridCol w="1634669">
+                <a:gridCol w="1615798">
                   <a:extLst>
                     <a:ext uri="{9D8B030D-6E8A-4147-A177-3AD203B41FA5}">
                       <a16:colId xmlns:a16="http://schemas.microsoft.com/office/drawing/2014/main" val="3793656128"/>
                     </a:ext>
                   </a:extLst>
                 </a:gridCol>
-                <a:gridCol w="946673">
+                <a:gridCol w="772886">
                   <a:extLst>
                     <a:ext uri="{9D8B030D-6E8A-4147-A177-3AD203B41FA5}">
                       <a16:colId xmlns:a16="http://schemas.microsoft.com/office/drawing/2014/main" val="4152533886"/>
                     </a:ext>
                   </a:extLst>
                 </a:gridCol>
-                <a:gridCol w="4302726">
+                <a:gridCol w="4763230">
                   <a:extLst>
                     <a:ext uri="{9D8B030D-6E8A-4147-A177-3AD203B41FA5}">
                       <a16:colId xmlns:a16="http://schemas.microsoft.com/office/drawing/2014/main" val="2548948971"/>
@@ -3277,7 +3277,7 @@
                     <a:p>
                       <a:pPr algn="ctr"/>
                       <a:r>
-                        <a:rPr lang="en-US" sz="1400" dirty="0">
+                        <a:rPr lang="en-US" sz="1200" dirty="0">
                           <a:solidFill>
                             <a:schemeClr val="tx1"/>
                           </a:solidFill>
@@ -3320,7 +3320,11 @@
                     <a:p>
                       <a:pPr algn="ctr"/>
                       <a:r>
-                        <a:rPr lang="en-US" sz="1200" dirty="0"/>
+                        <a:rPr lang="en-US" sz="1200" dirty="0">
+                          <a:solidFill>
+                            <a:schemeClr val="tx1"/>
+                          </a:solidFill>
+                        </a:rPr>
                         <a:t>Telemetry</a:t>
                       </a:r>
                     </a:p>
@@ -3388,7 +3392,7 @@
                       <a:r>
                         <a:rPr lang="en-US" sz="1100" dirty="0">
                           <a:solidFill>
-                            <a:srgbClr val="FF0000"/>
+                            <a:schemeClr val="tx1"/>
                           </a:solidFill>
                           <a:latin typeface="Arial" panose="020B0604020202020204" pitchFamily="34" charset="0"/>
                           <a:cs typeface="Arial" panose="020B0604020202020204" pitchFamily="34" charset="0"/>
@@ -3429,27 +3433,7 @@
                           <a:latin typeface="Courier New" panose="02070309020205020404" pitchFamily="49" charset="0"/>
                           <a:cs typeface="Courier New" panose="02070309020205020404" pitchFamily="49" charset="0"/>
                         </a:rPr>
-                        <a:t>{“temperature”:23</a:t>
-                      </a:r>
-                      <a:r>
-                        <a:rPr lang="en-US" sz="1200" dirty="0">
-                          <a:solidFill>
-                            <a:srgbClr val="FF0000"/>
-                          </a:solidFill>
-                          <a:latin typeface="Courier New" panose="02070309020205020404" pitchFamily="49" charset="0"/>
-                          <a:cs typeface="Courier New" panose="02070309020205020404" pitchFamily="49" charset="0"/>
-                        </a:rPr>
-                        <a:t>.752</a:t>
-                      </a:r>
-                      <a:r>
-                        <a:rPr lang="en-US" sz="1200" dirty="0">
-                          <a:solidFill>
-                            <a:schemeClr val="tx1"/>
-                          </a:solidFill>
-                          <a:latin typeface="Courier New" panose="02070309020205020404" pitchFamily="49" charset="0"/>
-                          <a:cs typeface="Courier New" panose="02070309020205020404" pitchFamily="49" charset="0"/>
-                        </a:rPr>
-                        <a:t>}</a:t>
+                        <a:t>{“temperature”:23.752}</a:t>
                       </a:r>
                     </a:p>
                   </a:txBody>
@@ -3485,7 +3469,11 @@
                         <a:defRPr/>
                       </a:pPr>
                       <a:r>
-                        <a:rPr lang="en-US" sz="1200" dirty="0"/>
+                        <a:rPr lang="en-US" sz="1200" dirty="0">
+                          <a:solidFill>
+                            <a:schemeClr val="tx1"/>
+                          </a:solidFill>
+                        </a:rPr>
                         <a:t>Telemetry</a:t>
                       </a:r>
                     </a:p>
@@ -3499,24 +3487,14 @@
                     <a:p>
                       <a:pPr algn="ctr"/>
                       <a:r>
-                        <a:rPr lang="en-US" sz="1100" strike="sngStrike" dirty="0">
-                          <a:solidFill>
-                            <a:srgbClr val="FF0000"/>
+                        <a:rPr lang="en-US" sz="1100" dirty="0">
+                          <a:solidFill>
+                            <a:schemeClr val="tx1"/>
                           </a:solidFill>
                           <a:latin typeface="Courier New" panose="02070309020205020404" pitchFamily="49" charset="0"/>
                           <a:cs typeface="Courier New" panose="02070309020205020404" pitchFamily="49" charset="0"/>
                         </a:rPr>
-                        <a:t>Illuminance</a:t>
-                      </a:r>
-                      <a:r>
-                        <a:rPr lang="en-US" sz="1100" dirty="0">
-                          <a:solidFill>
-                            <a:srgbClr val="FF0000"/>
-                          </a:solidFill>
-                          <a:latin typeface="Courier New" panose="02070309020205020404" pitchFamily="49" charset="0"/>
-                          <a:cs typeface="Courier New" panose="02070309020205020404" pitchFamily="49" charset="0"/>
-                        </a:rPr>
-                        <a:t> light</a:t>
+                        <a:t>light</a:t>
                       </a:r>
                     </a:p>
                   </a:txBody>
@@ -3545,7 +3523,11 @@
                         <a:defRPr/>
                       </a:pPr>
                       <a:r>
-                        <a:rPr lang="en-US" sz="1200" dirty="0"/>
+                        <a:rPr lang="en-US" sz="1200" dirty="0">
+                          <a:solidFill>
+                            <a:schemeClr val="tx1"/>
+                          </a:solidFill>
+                        </a:rPr>
                         <a:t>integer</a:t>
                       </a:r>
                     </a:p>
@@ -3582,7 +3564,7 @@
                           <a:latin typeface="Courier New" panose="02070309020205020404" pitchFamily="49" charset="0"/>
                           <a:cs typeface="Courier New" panose="02070309020205020404" pitchFamily="49" charset="0"/>
                         </a:rPr>
-                        <a:t>{“light”:5000}</a:t>
+                        <a:t>{“light”:5150}</a:t>
                       </a:r>
                     </a:p>
                   </a:txBody>
@@ -3618,7 +3600,11 @@
                         <a:defRPr/>
                       </a:pPr>
                       <a:r>
-                        <a:rPr lang="en-US" sz="1200" dirty="0"/>
+                        <a:rPr lang="en-US" sz="1200" dirty="0">
+                          <a:solidFill>
+                            <a:schemeClr val="tx1"/>
+                          </a:solidFill>
+                        </a:rPr>
                         <a:t>Telemetry</a:t>
                       </a:r>
                     </a:p>
@@ -3679,7 +3665,7 @@
                     <a:p>
                       <a:pPr algn="ctr"/>
                       <a:r>
-                        <a:rPr lang="en-US" sz="1200" dirty="0">
+                        <a:rPr lang="en-US" sz="1100" dirty="0">
                           <a:solidFill>
                             <a:schemeClr val="tx1"/>
                           </a:solidFill>
@@ -3689,7 +3675,7 @@
                         <a:t>{“</a:t>
                       </a:r>
                       <a:r>
-                        <a:rPr lang="en-US" sz="1200" dirty="0" err="1">
+                        <a:rPr lang="en-US" sz="1100" dirty="0" err="1">
                           <a:solidFill>
                             <a:schemeClr val="tx1"/>
                           </a:solidFill>
@@ -3699,14 +3685,14 @@
                         <a:t>button_event</a:t>
                       </a:r>
                       <a:r>
-                        <a:rPr lang="en-US" sz="1200" dirty="0">
+                        <a:rPr lang="en-US" sz="1100" dirty="0">
                           <a:solidFill>
                             <a:schemeClr val="tx1"/>
                           </a:solidFill>
                           <a:latin typeface="Courier New" panose="02070309020205020404" pitchFamily="49" charset="0"/>
                           <a:cs typeface="Courier New" panose="02070309020205020404" pitchFamily="49" charset="0"/>
                         </a:rPr>
-                        <a:t>”:{“button_name”:“SW1”, “press_count”:2}}</a:t>
+                        <a:t>”:{“button_name”:“SW1”,“press_count”:2}}</a:t>
                       </a:r>
                     </a:p>
                   </a:txBody>
@@ -3726,28 +3712,12 @@
                     <a:p>
                       <a:pPr algn="ctr"/>
                       <a:r>
-                        <a:rPr lang="en-US" sz="1200" dirty="0"/>
-                        <a:t>Property (</a:t>
-                      </a:r>
-                      <a:r>
-                        <a:rPr lang="en-US" sz="1200" strike="sngStrike" dirty="0">
-                          <a:solidFill>
-                            <a:srgbClr val="FF0000"/>
-                          </a:solidFill>
-                        </a:rPr>
-                        <a:t>Writable</a:t>
-                      </a:r>
-                      <a:r>
                         <a:rPr lang="en-US" sz="1200" dirty="0">
                           <a:solidFill>
-                            <a:srgbClr val="FF0000"/>
-                          </a:solidFill>
-                        </a:rPr>
-                        <a:t> Read-Only</a:t>
-                      </a:r>
-                      <a:r>
-                        <a:rPr lang="en-US" sz="1200" dirty="0"/>
-                        <a:t>)</a:t>
+                            <a:schemeClr val="tx1"/>
+                          </a:solidFill>
+                        </a:rPr>
+                        <a:t>Property (Read-Only)</a:t>
                       </a:r>
                     </a:p>
                   </a:txBody>
@@ -3882,28 +3852,12 @@
                     <a:p>
                       <a:pPr algn="ctr"/>
                       <a:r>
-                        <a:rPr lang="en-US" sz="1200" dirty="0"/>
-                        <a:t>Property (</a:t>
-                      </a:r>
-                      <a:r>
-                        <a:rPr lang="en-US" sz="1200" strike="sngStrike" dirty="0">
-                          <a:solidFill>
-                            <a:srgbClr val="FF0000"/>
-                          </a:solidFill>
-                        </a:rPr>
-                        <a:t>Writable</a:t>
-                      </a:r>
-                      <a:r>
                         <a:rPr lang="en-US" sz="1200" dirty="0">
                           <a:solidFill>
-                            <a:srgbClr val="FF0000"/>
-                          </a:solidFill>
-                        </a:rPr>
-                        <a:t> Read-Only</a:t>
-                      </a:r>
-                      <a:r>
-                        <a:rPr lang="en-US" sz="1200" dirty="0"/>
-                        <a:t>)</a:t>
+                            <a:schemeClr val="tx1"/>
+                          </a:solidFill>
+                        </a:rPr>
+                        <a:t>Property (Read-Only)</a:t>
                       </a:r>
                     </a:p>
                   </a:txBody>
@@ -4038,28 +3992,12 @@
                     <a:p>
                       <a:pPr algn="ctr"/>
                       <a:r>
-                        <a:rPr lang="en-US" sz="1200" dirty="0"/>
-                        <a:t>Property (</a:t>
-                      </a:r>
-                      <a:r>
-                        <a:rPr lang="en-US" sz="1200" strike="sngStrike" dirty="0">
-                          <a:solidFill>
-                            <a:srgbClr val="FF0000"/>
-                          </a:solidFill>
-                        </a:rPr>
-                        <a:t>Writable</a:t>
-                      </a:r>
-                      <a:r>
                         <a:rPr lang="en-US" sz="1200" dirty="0">
                           <a:solidFill>
-                            <a:srgbClr val="FF0000"/>
-                          </a:solidFill>
-                        </a:rPr>
-                        <a:t> Read-Only</a:t>
-                      </a:r>
-                      <a:r>
-                        <a:rPr lang="en-US" sz="1200" dirty="0"/>
-                        <a:t>)</a:t>
+                            <a:schemeClr val="tx1"/>
+                          </a:solidFill>
+                        </a:rPr>
+                        <a:t>Property (Read-Only)</a:t>
                       </a:r>
                     </a:p>
                   </a:txBody>
@@ -4194,7 +4132,11 @@
                     <a:p>
                       <a:pPr algn="ctr"/>
                       <a:r>
-                        <a:rPr lang="en-US" sz="1200" dirty="0"/>
+                        <a:rPr lang="en-US" sz="1200" dirty="0">
+                          <a:solidFill>
+                            <a:schemeClr val="tx1"/>
+                          </a:solidFill>
+                        </a:rPr>
                         <a:t>Property (Writable)</a:t>
                       </a:r>
                     </a:p>
@@ -4303,44 +4245,34 @@
                         <a:defRPr/>
                       </a:pPr>
                       <a:r>
-                        <a:rPr lang="en-US" sz="1100" strike="sngStrike" dirty="0">
-                          <a:solidFill>
-                            <a:srgbClr val="FF0000"/>
+                        <a:rPr lang="en-US" sz="1100" b="0" dirty="0">
+                          <a:solidFill>
+                            <a:schemeClr val="tx1"/>
                           </a:solidFill>
                           <a:latin typeface="Courier New" panose="02070309020205020404" pitchFamily="49" charset="0"/>
                           <a:cs typeface="Courier New" panose="02070309020205020404" pitchFamily="49" charset="0"/>
                         </a:rPr>
-                        <a:t>{“led_yellow”:2} </a:t>
-                      </a:r>
-                      <a:r>
-                        <a:rPr lang="en-US" sz="1100" b="0" dirty="0">
-                          <a:solidFill>
-                            <a:srgbClr val="FF0000"/>
+                        <a:t>{“</a:t>
+                      </a:r>
+                      <a:r>
+                        <a:rPr lang="en-US" sz="1100" b="0" dirty="0" err="1">
+                          <a:solidFill>
+                            <a:schemeClr val="tx1"/>
                           </a:solidFill>
                           <a:latin typeface="Courier New" panose="02070309020205020404" pitchFamily="49" charset="0"/>
                           <a:cs typeface="Courier New" panose="02070309020205020404" pitchFamily="49" charset="0"/>
                         </a:rPr>
-                        <a:t>{“</a:t>
-                      </a:r>
-                      <a:r>
-                        <a:rPr lang="en-US" sz="1100" b="0" dirty="0" err="1">
-                          <a:solidFill>
-                            <a:srgbClr val="FF0000"/>
+                        <a:t>led_yellow</a:t>
+                      </a:r>
+                      <a:r>
+                        <a:rPr lang="en-US" sz="1100" b="0" dirty="0">
+                          <a:solidFill>
+                            <a:schemeClr val="tx1"/>
                           </a:solidFill>
                           <a:latin typeface="Courier New" panose="02070309020205020404" pitchFamily="49" charset="0"/>
                           <a:cs typeface="Courier New" panose="02070309020205020404" pitchFamily="49" charset="0"/>
                         </a:rPr>
-                        <a:t>led_yellow</a:t>
-                      </a:r>
-                      <a:r>
-                        <a:rPr lang="en-US" sz="1100" b="0" dirty="0">
-                          <a:solidFill>
-                            <a:srgbClr val="FF0000"/>
-                          </a:solidFill>
-                          <a:latin typeface="Courier New" panose="02070309020205020404" pitchFamily="49" charset="0"/>
-                          <a:cs typeface="Courier New" panose="02070309020205020404" pitchFamily="49" charset="0"/>
-                        </a:rPr>
-                        <a:t>”:{“ac”:200,“av”:110,“ad”:“success”,“value”:2}}</a:t>
+                        <a:t>”:{“ac”:200,“av”:69,“ad”:“OK”,“value”:2}}</a:t>
                       </a:r>
                     </a:p>
                   </a:txBody>
@@ -4376,7 +4308,11 @@
                         <a:defRPr/>
                       </a:pPr>
                       <a:r>
-                        <a:rPr lang="en-US" sz="1200" dirty="0"/>
+                        <a:rPr lang="en-US" sz="1200" dirty="0">
+                          <a:solidFill>
+                            <a:schemeClr val="tx1"/>
+                          </a:solidFill>
+                        </a:rPr>
                         <a:t>Property (Writable)</a:t>
                       </a:r>
                     </a:p>
@@ -4485,14 +4421,34 @@
                         <a:defRPr/>
                       </a:pPr>
                       <a:r>
-                        <a:rPr lang="en-US" sz="1200" strike="sngStrike" dirty="0">
-                          <a:solidFill>
-                            <a:srgbClr val="FF0000"/>
+                        <a:rPr lang="en-US" sz="1200" dirty="0">
+                          <a:solidFill>
+                            <a:schemeClr val="tx1"/>
                           </a:solidFill>
                           <a:latin typeface="Courier New" panose="02070309020205020404" pitchFamily="49" charset="0"/>
                           <a:cs typeface="Courier New" panose="02070309020205020404" pitchFamily="49" charset="0"/>
                         </a:rPr>
-                        <a:t>{“telemetryInterval”:20}</a:t>
+                        <a:t>{“</a:t>
+                      </a:r>
+                      <a:r>
+                        <a:rPr lang="en-US" sz="1200" dirty="0" err="1">
+                          <a:solidFill>
+                            <a:schemeClr val="tx1"/>
+                          </a:solidFill>
+                          <a:latin typeface="Courier New" panose="02070309020205020404" pitchFamily="49" charset="0"/>
+                          <a:cs typeface="Courier New" panose="02070309020205020404" pitchFamily="49" charset="0"/>
+                        </a:rPr>
+                        <a:t>telemetryInterval</a:t>
+                      </a:r>
+                      <a:r>
+                        <a:rPr lang="en-US" sz="1200" dirty="0">
+                          <a:solidFill>
+                            <a:schemeClr val="tx1"/>
+                          </a:solidFill>
+                          <a:latin typeface="Courier New" panose="02070309020205020404" pitchFamily="49" charset="0"/>
+                          <a:cs typeface="Courier New" panose="02070309020205020404" pitchFamily="49" charset="0"/>
+                        </a:rPr>
+                        <a:t>”:{“ac”:200,“av”:55,</a:t>
                       </a:r>
                     </a:p>
                     <a:p>
@@ -4516,32 +4472,12 @@
                       <a:r>
                         <a:rPr lang="en-US" sz="1200" dirty="0">
                           <a:solidFill>
-                            <a:srgbClr val="FF0000"/>
+                            <a:schemeClr val="tx1"/>
                           </a:solidFill>
                           <a:latin typeface="Courier New" panose="02070309020205020404" pitchFamily="49" charset="0"/>
                           <a:cs typeface="Courier New" panose="02070309020205020404" pitchFamily="49" charset="0"/>
                         </a:rPr>
-                        <a:t>{“</a:t>
-                      </a:r>
-                      <a:r>
-                        <a:rPr lang="en-US" sz="1200" dirty="0" err="1">
-                          <a:solidFill>
-                            <a:srgbClr val="FF0000"/>
-                          </a:solidFill>
-                          <a:latin typeface="Courier New" panose="02070309020205020404" pitchFamily="49" charset="0"/>
-                          <a:cs typeface="Courier New" panose="02070309020205020404" pitchFamily="49" charset="0"/>
-                        </a:rPr>
-                        <a:t>telemetryInterval</a:t>
-                      </a:r>
-                      <a:r>
-                        <a:rPr lang="en-US" sz="1200" dirty="0">
-                          <a:solidFill>
-                            <a:srgbClr val="FF0000"/>
-                          </a:solidFill>
-                          <a:latin typeface="Courier New" panose="02070309020205020404" pitchFamily="49" charset="0"/>
-                          <a:cs typeface="Courier New" panose="02070309020205020404" pitchFamily="49" charset="0"/>
-                        </a:rPr>
-                        <a:t>”:{“ac”:200,“av”:55, “ad”:“accepted”,“value”:20}}</a:t>
+                        <a:t>“ad”:“accepted”,“value”:20}}</a:t>
                       </a:r>
                     </a:p>
                   </a:txBody>
@@ -4563,7 +4499,7 @@
                       <a:r>
                         <a:rPr lang="en-US" sz="1200" dirty="0">
                           <a:solidFill>
-                            <a:srgbClr val="FF0000"/>
+                            <a:schemeClr val="tx1"/>
                           </a:solidFill>
                         </a:rPr>
                         <a:t>Command (Request)</a:t>
@@ -4597,7 +4533,7 @@
                       <a:r>
                         <a:rPr lang="en-US" sz="1200" dirty="0">
                           <a:solidFill>
-                            <a:srgbClr val="FF0000"/>
+                            <a:schemeClr val="tx1"/>
                           </a:solidFill>
                           <a:latin typeface="Courier New" panose="02070309020205020404" pitchFamily="49" charset="0"/>
                           <a:cs typeface="Courier New" panose="02070309020205020404" pitchFamily="49" charset="0"/>
@@ -4633,7 +4569,7 @@
                       <a:r>
                         <a:rPr lang="en-US" sz="1100" dirty="0">
                           <a:solidFill>
-                            <a:srgbClr val="FF0000"/>
+                            <a:schemeClr val="tx1"/>
                           </a:solidFill>
                           <a:latin typeface="Arial" panose="020B0604020202020204" pitchFamily="34" charset="0"/>
                           <a:cs typeface="Arial" panose="020B0604020202020204" pitchFamily="34" charset="0"/>
@@ -4669,12 +4605,12 @@
                       <a:r>
                         <a:rPr lang="en-US" sz="1200" dirty="0">
                           <a:solidFill>
-                            <a:srgbClr val="FF0000"/>
+                            <a:schemeClr val="tx1"/>
                           </a:solidFill>
                           <a:latin typeface="Courier New" panose="02070309020205020404" pitchFamily="49" charset="0"/>
                           <a:cs typeface="Courier New" panose="02070309020205020404" pitchFamily="49" charset="0"/>
                         </a:rPr>
-                        <a:t>{“payload”:{“delay”:“PT5S”}}</a:t>
+                        <a:t>{“delay”:“PT5S”}</a:t>
                       </a:r>
                     </a:p>
                   </a:txBody>
@@ -4710,9 +4646,9 @@
                         <a:defRPr/>
                       </a:pPr>
                       <a:r>
-                        <a:rPr lang="en-US" sz="1200" dirty="0">
-                          <a:solidFill>
-                            <a:srgbClr val="FF0000"/>
+                        <a:rPr lang="en-US" sz="1100" dirty="0">
+                          <a:solidFill>
+                            <a:schemeClr val="tx1"/>
                           </a:solidFill>
                         </a:rPr>
                         <a:t>Command (Response)</a:t>
@@ -4746,7 +4682,7 @@
                       <a:r>
                         <a:rPr lang="en-US" sz="1200" dirty="0">
                           <a:solidFill>
-                            <a:srgbClr val="FF0000"/>
+                            <a:schemeClr val="tx1"/>
                           </a:solidFill>
                           <a:latin typeface="Courier New" panose="02070309020205020404" pitchFamily="49" charset="0"/>
                           <a:cs typeface="Courier New" panose="02070309020205020404" pitchFamily="49" charset="0"/>
@@ -4782,7 +4718,7 @@
                       <a:r>
                         <a:rPr lang="en-US" sz="1100" dirty="0">
                           <a:solidFill>
-                            <a:srgbClr val="FF0000"/>
+                            <a:schemeClr val="tx1"/>
                           </a:solidFill>
                           <a:latin typeface="Arial" panose="020B0604020202020204" pitchFamily="34" charset="0"/>
                           <a:cs typeface="Arial" panose="020B0604020202020204" pitchFamily="34" charset="0"/>
@@ -4818,12 +4754,12 @@
                       <a:r>
                         <a:rPr lang="en-US" sz="1200" dirty="0">
                           <a:solidFill>
-                            <a:srgbClr val="FF0000"/>
+                            <a:schemeClr val="tx1"/>
                           </a:solidFill>
                           <a:latin typeface="Courier New" panose="02070309020205020404" pitchFamily="49" charset="0"/>
                           <a:cs typeface="Courier New" panose="02070309020205020404" pitchFamily="49" charset="0"/>
                         </a:rPr>
-                        <a:t>{“response”:{“status”:“success”,“delay”:5}}</a:t>
+                        <a:t>{“status”:“success”,“delay”:5}</a:t>
                       </a:r>
                     </a:p>
                   </a:txBody>
@@ -4859,7 +4795,11 @@
                         <a:defRPr/>
                       </a:pPr>
                       <a:r>
-                        <a:rPr lang="en-US" sz="1200" dirty="0"/>
+                        <a:rPr lang="en-US" sz="1200" dirty="0">
+                          <a:solidFill>
+                            <a:schemeClr val="tx1"/>
+                          </a:solidFill>
+                        </a:rPr>
                         <a:t>Command (Request)</a:t>
                       </a:r>
                     </a:p>
@@ -4891,22 +4831,12 @@
                       <a:r>
                         <a:rPr lang="en-US" sz="1200" dirty="0" err="1">
                           <a:solidFill>
-                            <a:srgbClr val="FF0000"/>
+                            <a:schemeClr val="tx1"/>
                           </a:solidFill>
                           <a:latin typeface="Courier New" panose="02070309020205020404" pitchFamily="49" charset="0"/>
                           <a:cs typeface="Courier New" panose="02070309020205020404" pitchFamily="49" charset="0"/>
                         </a:rPr>
-                        <a:t>echo</a:t>
-                      </a:r>
-                      <a:r>
-                        <a:rPr lang="en-US" sz="1200" dirty="0" err="1">
-                          <a:solidFill>
-                            <a:schemeClr val="tx1"/>
-                          </a:solidFill>
-                          <a:latin typeface="Courier New" panose="02070309020205020404" pitchFamily="49" charset="0"/>
-                          <a:cs typeface="Courier New" panose="02070309020205020404" pitchFamily="49" charset="0"/>
-                        </a:rPr>
-                        <a:t>Msg</a:t>
+                        <a:t>echoMsg</a:t>
                       </a:r>
                       <a:endParaRPr lang="en-US" sz="1200" dirty="0">
                         <a:solidFill>
@@ -4985,37 +4915,47 @@
                           <a:latin typeface="Courier New" panose="02070309020205020404" pitchFamily="49" charset="0"/>
                           <a:cs typeface="Courier New" panose="02070309020205020404" pitchFamily="49" charset="0"/>
                         </a:rPr>
-                        <a:t>{“payload”:{“</a:t>
+                        <a:t>{“</a:t>
                       </a:r>
                       <a:r>
                         <a:rPr lang="en-US" sz="1200" dirty="0" err="1">
                           <a:solidFill>
-                            <a:srgbClr val="FF0000"/>
+                            <a:schemeClr val="tx1"/>
                           </a:solidFill>
                           <a:latin typeface="Courier New" panose="02070309020205020404" pitchFamily="49" charset="0"/>
                           <a:cs typeface="Courier New" panose="02070309020205020404" pitchFamily="49" charset="0"/>
                         </a:rPr>
-                        <a:t>echo</a:t>
-                      </a:r>
-                      <a:r>
-                        <a:rPr lang="en-US" sz="1200" dirty="0" err="1">
+                        <a:t>echoMsgString</a:t>
+                      </a:r>
+                      <a:r>
+                        <a:rPr lang="en-US" sz="1200" dirty="0">
                           <a:solidFill>
                             <a:schemeClr val="tx1"/>
                           </a:solidFill>
                           <a:latin typeface="Courier New" panose="02070309020205020404" pitchFamily="49" charset="0"/>
                           <a:cs typeface="Courier New" panose="02070309020205020404" pitchFamily="49" charset="0"/>
                         </a:rPr>
-                        <a:t>MsgString</a:t>
-                      </a:r>
-                      <a:r>
-                        <a:rPr lang="en-US" sz="1200" dirty="0">
+                        <a:t>”:“Hello, </a:t>
+                      </a:r>
+                      <a:r>
+                        <a:rPr lang="en-US" sz="1200" dirty="0" err="1">
                           <a:solidFill>
                             <a:schemeClr val="tx1"/>
                           </a:solidFill>
                           <a:latin typeface="Courier New" panose="02070309020205020404" pitchFamily="49" charset="0"/>
                           <a:cs typeface="Courier New" panose="02070309020205020404" pitchFamily="49" charset="0"/>
                         </a:rPr>
-                        <a:t>”:“Hello, Ronwell”}}</a:t>
+                        <a:t>Ronwell</a:t>
+                      </a:r>
+                      <a:r>
+                        <a:rPr lang="en-US" sz="1200" dirty="0">
+                          <a:solidFill>
+                            <a:schemeClr val="tx1"/>
+                          </a:solidFill>
+                          <a:latin typeface="Courier New" panose="02070309020205020404" pitchFamily="49" charset="0"/>
+                          <a:cs typeface="Courier New" panose="02070309020205020404" pitchFamily="49" charset="0"/>
+                        </a:rPr>
+                        <a:t>”}</a:t>
                       </a:r>
                     </a:p>
                   </a:txBody>
@@ -5051,7 +4991,11 @@
                         <a:defRPr/>
                       </a:pPr>
                       <a:r>
-                        <a:rPr lang="en-US" sz="1200" dirty="0"/>
+                        <a:rPr lang="en-US" sz="1100" dirty="0">
+                          <a:solidFill>
+                            <a:schemeClr val="tx1"/>
+                          </a:solidFill>
+                        </a:rPr>
                         <a:t>Command (Response)</a:t>
                       </a:r>
                     </a:p>
@@ -5083,22 +5027,12 @@
                       <a:r>
                         <a:rPr lang="en-US" sz="1200" dirty="0" err="1">
                           <a:solidFill>
-                            <a:srgbClr val="FF0000"/>
+                            <a:schemeClr val="tx1"/>
                           </a:solidFill>
                           <a:latin typeface="Courier New" panose="02070309020205020404" pitchFamily="49" charset="0"/>
                           <a:cs typeface="Courier New" panose="02070309020205020404" pitchFamily="49" charset="0"/>
                         </a:rPr>
-                        <a:t>echo</a:t>
-                      </a:r>
-                      <a:r>
-                        <a:rPr lang="en-US" sz="1200" dirty="0" err="1">
-                          <a:solidFill>
-                            <a:schemeClr val="tx1"/>
-                          </a:solidFill>
-                          <a:latin typeface="Courier New" panose="02070309020205020404" pitchFamily="49" charset="0"/>
-                          <a:cs typeface="Courier New" panose="02070309020205020404" pitchFamily="49" charset="0"/>
-                        </a:rPr>
-                        <a:t>Msg</a:t>
+                        <a:t>echoMsg</a:t>
                       </a:r>
                       <a:endParaRPr lang="en-US" sz="1200" dirty="0">
                         <a:solidFill>
@@ -5177,12 +5111,12 @@
                           <a:latin typeface="Courier New" panose="02070309020205020404" pitchFamily="49" charset="0"/>
                           <a:cs typeface="Courier New" panose="02070309020205020404" pitchFamily="49" charset="0"/>
                         </a:rPr>
-                        <a:t>{“response”:{“</a:t>
+                        <a:t>{“</a:t>
                       </a:r>
                       <a:r>
                         <a:rPr lang="en-US" sz="1200" dirty="0" err="1">
                           <a:solidFill>
-                            <a:srgbClr val="FF0000"/>
+                            <a:schemeClr val="tx1"/>
                           </a:solidFill>
                           <a:latin typeface="Courier New" panose="02070309020205020404" pitchFamily="49" charset="0"/>
                           <a:cs typeface="Courier New" panose="02070309020205020404" pitchFamily="49" charset="0"/>
@@ -5197,22 +5131,12 @@
                           <a:latin typeface="Courier New" panose="02070309020205020404" pitchFamily="49" charset="0"/>
                           <a:cs typeface="Courier New" panose="02070309020205020404" pitchFamily="49" charset="0"/>
                         </a:rPr>
-                        <a:t>”:“</a:t>
-                      </a:r>
-                      <a:r>
-                        <a:rPr lang="en-US" sz="1200" dirty="0">
-                          <a:solidFill>
-                            <a:srgbClr val="FF0000"/>
-                          </a:solidFill>
-                          <a:latin typeface="Courier New" panose="02070309020205020404" pitchFamily="49" charset="0"/>
-                          <a:cs typeface="Courier New" panose="02070309020205020404" pitchFamily="49" charset="0"/>
-                        </a:rPr>
-                        <a:t>Hello, </a:t>
+                        <a:t>”:“Hello, </a:t>
                       </a:r>
                       <a:r>
                         <a:rPr lang="en-US" sz="1200" dirty="0" err="1">
                           <a:solidFill>
-                            <a:srgbClr val="FF0000"/>
+                            <a:schemeClr val="tx1"/>
                           </a:solidFill>
                           <a:latin typeface="Courier New" panose="02070309020205020404" pitchFamily="49" charset="0"/>
                           <a:cs typeface="Courier New" panose="02070309020205020404" pitchFamily="49" charset="0"/>
@@ -6270,6 +6194,17 @@
 </file>
 
 <file path=customXml/item1.xml><?xml version="1.0" encoding="utf-8"?>
+<p:properties xmlns:p="http://schemas.microsoft.com/office/2006/metadata/properties" xmlns:xsi="http://www.w3.org/2001/XMLSchema-instance" xmlns:pc="http://schemas.microsoft.com/office/infopath/2007/PartnerControls">
+  <documentManagement>
+    <TaxCatchAll xmlns="558cdac9-e1e2-427d-84c4-2e31b7ae4963" xsi:nil="true"/>
+    <lcf76f155ced4ddcb4097134ff3c332f xmlns="33c4a4ff-b22f-4379-b335-5d18aca9a9f1">
+      <Terms xmlns="http://schemas.microsoft.com/office/infopath/2007/PartnerControls"/>
+    </lcf76f155ced4ddcb4097134ff3c332f>
+  </documentManagement>
+</p:properties>
+</file>
+
+<file path=customXml/item2.xml><?xml version="1.0" encoding="utf-8"?>
 <ct:contentTypeSchema xmlns:ct="http://schemas.microsoft.com/office/2006/metadata/contentType" xmlns:ma="http://schemas.microsoft.com/office/2006/metadata/properties/metaAttributes" ct:_="" ma:_="" ma:contentTypeName="Document" ma:contentTypeID="0x0101004133D5F967D14C478A9B93B6E4AAE0A1" ma:contentTypeVersion="12" ma:contentTypeDescription="Create a new document." ma:contentTypeScope="" ma:versionID="be39687eb0009d0a279fadb1ee38cbf3">
   <xsd:schema xmlns:xsd="http://www.w3.org/2001/XMLSchema" xmlns:xs="http://www.w3.org/2001/XMLSchema" xmlns:p="http://schemas.microsoft.com/office/2006/metadata/properties" xmlns:ns2="33c4a4ff-b22f-4379-b335-5d18aca9a9f1" xmlns:ns3="558cdac9-e1e2-427d-84c4-2e31b7ae4963" targetNamespace="http://schemas.microsoft.com/office/2006/metadata/properties" ma:root="true" ma:fieldsID="7252c307e70b2973b92a92ec92737868" ns2:_="" ns3:_="">
     <xsd:import namespace="33c4a4ff-b22f-4379-b335-5d18aca9a9f1"/>
@@ -6464,17 +6399,6 @@
 </ct:contentTypeSchema>
 </file>
 
-<file path=customXml/item2.xml><?xml version="1.0" encoding="utf-8"?>
-<p:properties xmlns:p="http://schemas.microsoft.com/office/2006/metadata/properties" xmlns:xsi="http://www.w3.org/2001/XMLSchema-instance" xmlns:pc="http://schemas.microsoft.com/office/infopath/2007/PartnerControls">
-  <documentManagement>
-    <TaxCatchAll xmlns="558cdac9-e1e2-427d-84c4-2e31b7ae4963" xsi:nil="true"/>
-    <lcf76f155ced4ddcb4097134ff3c332f xmlns="33c4a4ff-b22f-4379-b335-5d18aca9a9f1">
-      <Terms xmlns="http://schemas.microsoft.com/office/infopath/2007/PartnerControls"/>
-    </lcf76f155ced4ddcb4097134ff3c332f>
-  </documentManagement>
-</p:properties>
-</file>
-
 <file path=customXml/item3.xml><?xml version="1.0" encoding="utf-8"?>
 <?mso-contentType ?>
 <FormTemplates xmlns="http://schemas.microsoft.com/sharepoint/v3/contenttype/forms">
@@ -6485,6 +6409,25 @@
 </file>
 
 <file path=customXml/itemProps1.xml><?xml version="1.0" encoding="utf-8"?>
+<ds:datastoreItem xmlns:ds="http://schemas.openxmlformats.org/officeDocument/2006/customXml" ds:itemID="{78B32717-00CD-49A3-9BD6-E41AC731BACE}">
+  <ds:schemaRefs>
+    <ds:schemaRef ds:uri="http://schemas.openxmlformats.org/package/2006/metadata/core-properties"/>
+    <ds:schemaRef ds:uri="http://schemas.microsoft.com/office/2006/documentManagement/types"/>
+    <ds:schemaRef ds:uri="http://schemas.microsoft.com/office/2006/metadata/properties"/>
+    <ds:schemaRef ds:uri="347e6746-a609-4dfd-bec0-5ddb48c7c195"/>
+    <ds:schemaRef ds:uri="http://www.w3.org/XML/1998/namespace"/>
+    <ds:schemaRef ds:uri="http://purl.org/dc/terms/"/>
+    <ds:schemaRef ds:uri="http://purl.org/dc/elements/1.1/"/>
+    <ds:schemaRef ds:uri="http://schemas.microsoft.com/office/infopath/2007/PartnerControls"/>
+    <ds:schemaRef ds:uri="fa83697a-01db-49a0-83aa-08966d365c68"/>
+    <ds:schemaRef ds:uri="http://purl.org/dc/dcmitype/"/>
+    <ds:schemaRef ds:uri="558cdac9-e1e2-427d-84c4-2e31b7ae4963"/>
+    <ds:schemaRef ds:uri="33c4a4ff-b22f-4379-b335-5d18aca9a9f1"/>
+  </ds:schemaRefs>
+</ds:datastoreItem>
+</file>
+
+<file path=customXml/itemProps2.xml><?xml version="1.0" encoding="utf-8"?>
 <ds:datastoreItem xmlns:ds="http://schemas.openxmlformats.org/officeDocument/2006/customXml" ds:itemID="{83E0CF9D-0F51-4E15-AFD5-E6866B97076E}">
   <ds:schemaRefs>
     <ds:schemaRef ds:uri="http://schemas.microsoft.com/office/2006/metadata/contentType"/>
@@ -6503,25 +6446,6 @@
 </ds:datastoreItem>
 </file>
 
-<file path=customXml/itemProps2.xml><?xml version="1.0" encoding="utf-8"?>
-<ds:datastoreItem xmlns:ds="http://schemas.openxmlformats.org/officeDocument/2006/customXml" ds:itemID="{78B32717-00CD-49A3-9BD6-E41AC731BACE}">
-  <ds:schemaRefs>
-    <ds:schemaRef ds:uri="http://schemas.openxmlformats.org/package/2006/metadata/core-properties"/>
-    <ds:schemaRef ds:uri="http://schemas.microsoft.com/office/2006/documentManagement/types"/>
-    <ds:schemaRef ds:uri="http://schemas.microsoft.com/office/2006/metadata/properties"/>
-    <ds:schemaRef ds:uri="347e6746-a609-4dfd-bec0-5ddb48c7c195"/>
-    <ds:schemaRef ds:uri="http://www.w3.org/XML/1998/namespace"/>
-    <ds:schemaRef ds:uri="http://purl.org/dc/terms/"/>
-    <ds:schemaRef ds:uri="http://purl.org/dc/elements/1.1/"/>
-    <ds:schemaRef ds:uri="http://schemas.microsoft.com/office/infopath/2007/PartnerControls"/>
-    <ds:schemaRef ds:uri="fa83697a-01db-49a0-83aa-08966d365c68"/>
-    <ds:schemaRef ds:uri="http://purl.org/dc/dcmitype/"/>
-    <ds:schemaRef ds:uri="558cdac9-e1e2-427d-84c4-2e31b7ae4963"/>
-    <ds:schemaRef ds:uri="33c4a4ff-b22f-4379-b335-5d18aca9a9f1"/>
-  </ds:schemaRefs>
-</ds:datastoreItem>
-</file>
-
 <file path=customXml/itemProps3.xml><?xml version="1.0" encoding="utf-8"?>
 <ds:datastoreItem xmlns:ds="http://schemas.openxmlformats.org/officeDocument/2006/customXml" ds:itemID="{DA8BEAEE-6B1D-4561-8298-B3692BAE161A}">
   <ds:schemaRefs>

</xml_diff>